<commit_message>
Adding propensity model tab to Shiny app. Adding analysis_id to covariate_analysis, covariate, preference_score_dist, and propensity_model tables. Fixes 7.
</commit_message>
<xml_diff>
--- a/vignettes/DataModel.pptx
+++ b/vignettes/DataModel.pptx
@@ -241,7 +241,7 @@
           <a:p>
             <a:fld id="{365C9929-806C-4F40-9578-CE1B791979AC}" type="datetimeFigureOut">
               <a:rPr lang="en-US" smtClean="0"/>
-              <a:t>9/26/2018</a:t>
+              <a:t>6/20/2019</a:t>
             </a:fld>
             <a:endParaRPr lang="en-US"/>
           </a:p>
@@ -409,7 +409,7 @@
           <a:p>
             <a:fld id="{365C9929-806C-4F40-9578-CE1B791979AC}" type="datetimeFigureOut">
               <a:rPr lang="en-US" smtClean="0"/>
-              <a:t>9/26/2018</a:t>
+              <a:t>6/20/2019</a:t>
             </a:fld>
             <a:endParaRPr lang="en-US"/>
           </a:p>
@@ -587,7 +587,7 @@
           <a:p>
             <a:fld id="{365C9929-806C-4F40-9578-CE1B791979AC}" type="datetimeFigureOut">
               <a:rPr lang="en-US" smtClean="0"/>
-              <a:t>9/26/2018</a:t>
+              <a:t>6/20/2019</a:t>
             </a:fld>
             <a:endParaRPr lang="en-US"/>
           </a:p>
@@ -755,7 +755,7 @@
           <a:p>
             <a:fld id="{365C9929-806C-4F40-9578-CE1B791979AC}" type="datetimeFigureOut">
               <a:rPr lang="en-US" smtClean="0"/>
-              <a:t>9/26/2018</a:t>
+              <a:t>6/20/2019</a:t>
             </a:fld>
             <a:endParaRPr lang="en-US"/>
           </a:p>
@@ -1000,7 +1000,7 @@
           <a:p>
             <a:fld id="{365C9929-806C-4F40-9578-CE1B791979AC}" type="datetimeFigureOut">
               <a:rPr lang="en-US" smtClean="0"/>
-              <a:t>9/26/2018</a:t>
+              <a:t>6/20/2019</a:t>
             </a:fld>
             <a:endParaRPr lang="en-US"/>
           </a:p>
@@ -1229,7 +1229,7 @@
           <a:p>
             <a:fld id="{365C9929-806C-4F40-9578-CE1B791979AC}" type="datetimeFigureOut">
               <a:rPr lang="en-US" smtClean="0"/>
-              <a:t>9/26/2018</a:t>
+              <a:t>6/20/2019</a:t>
             </a:fld>
             <a:endParaRPr lang="en-US"/>
           </a:p>
@@ -1593,7 +1593,7 @@
           <a:p>
             <a:fld id="{365C9929-806C-4F40-9578-CE1B791979AC}" type="datetimeFigureOut">
               <a:rPr lang="en-US" smtClean="0"/>
-              <a:t>9/26/2018</a:t>
+              <a:t>6/20/2019</a:t>
             </a:fld>
             <a:endParaRPr lang="en-US"/>
           </a:p>
@@ -1710,7 +1710,7 @@
           <a:p>
             <a:fld id="{365C9929-806C-4F40-9578-CE1B791979AC}" type="datetimeFigureOut">
               <a:rPr lang="en-US" smtClean="0"/>
-              <a:t>9/26/2018</a:t>
+              <a:t>6/20/2019</a:t>
             </a:fld>
             <a:endParaRPr lang="en-US"/>
           </a:p>
@@ -1805,7 +1805,7 @@
           <a:p>
             <a:fld id="{365C9929-806C-4F40-9578-CE1B791979AC}" type="datetimeFigureOut">
               <a:rPr lang="en-US" smtClean="0"/>
-              <a:t>9/26/2018</a:t>
+              <a:t>6/20/2019</a:t>
             </a:fld>
             <a:endParaRPr lang="en-US"/>
           </a:p>
@@ -2080,7 +2080,7 @@
           <a:p>
             <a:fld id="{365C9929-806C-4F40-9578-CE1B791979AC}" type="datetimeFigureOut">
               <a:rPr lang="en-US" smtClean="0"/>
-              <a:t>9/26/2018</a:t>
+              <a:t>6/20/2019</a:t>
             </a:fld>
             <a:endParaRPr lang="en-US"/>
           </a:p>
@@ -2332,7 +2332,7 @@
           <a:p>
             <a:fld id="{365C9929-806C-4F40-9578-CE1B791979AC}" type="datetimeFigureOut">
               <a:rPr lang="en-US" smtClean="0"/>
-              <a:t>9/26/2018</a:t>
+              <a:t>6/20/2019</a:t>
             </a:fld>
             <a:endParaRPr lang="en-US"/>
           </a:p>
@@ -2543,7 +2543,7 @@
           <a:p>
             <a:fld id="{365C9929-806C-4F40-9578-CE1B791979AC}" type="datetimeFigureOut">
               <a:rPr lang="en-US" smtClean="0"/>
-              <a:t>9/26/2018</a:t>
+              <a:t>6/20/2019</a:t>
             </a:fld>
             <a:endParaRPr lang="en-US"/>
           </a:p>
@@ -2957,7 +2957,7 @@
         <p:spPr>
           <a:xfrm>
             <a:off x="1983830" y="337375"/>
-            <a:ext cx="3239996" cy="4392616"/>
+            <a:ext cx="3239996" cy="4355275"/>
           </a:xfrm>
           <a:prstGeom prst="rect">
             <a:avLst/>
@@ -3006,7 +3006,7 @@
         <p:spPr>
           <a:xfrm>
             <a:off x="8709929" y="339451"/>
-            <a:ext cx="3422368" cy="3474967"/>
+            <a:ext cx="3422368" cy="3564294"/>
           </a:xfrm>
           <a:prstGeom prst="rect">
             <a:avLst/>
@@ -3054,8 +3054,8 @@
         </p:nvSpPr>
         <p:spPr>
           <a:xfrm>
-            <a:off x="5294266" y="332014"/>
-            <a:ext cx="3345223" cy="3867385"/>
+            <a:off x="5294266" y="332015"/>
+            <a:ext cx="3345223" cy="3814536"/>
           </a:xfrm>
           <a:prstGeom prst="rect">
             <a:avLst/>
@@ -3103,8 +3103,8 @@
         </p:nvSpPr>
         <p:spPr>
           <a:xfrm>
-            <a:off x="69240" y="337375"/>
-            <a:ext cx="1748972" cy="1529634"/>
+            <a:off x="69240" y="337374"/>
+            <a:ext cx="1748972" cy="1613993"/>
           </a:xfrm>
           <a:prstGeom prst="rect">
             <a:avLst/>
@@ -3151,8 +3151,8 @@
         </p:nvSpPr>
         <p:spPr>
           <a:xfrm>
-            <a:off x="69240" y="2987813"/>
-            <a:ext cx="1748972" cy="2536293"/>
+            <a:off x="67147" y="3004043"/>
+            <a:ext cx="1751065" cy="2444650"/>
           </a:xfrm>
           <a:prstGeom prst="rect">
             <a:avLst/>
@@ -3199,8 +3199,8 @@
         </p:nvSpPr>
         <p:spPr>
           <a:xfrm>
-            <a:off x="62104" y="1951368"/>
-            <a:ext cx="1755973" cy="952087"/>
+            <a:off x="67147" y="2028793"/>
+            <a:ext cx="1750930" cy="893188"/>
           </a:xfrm>
           <a:prstGeom prst="rect">
             <a:avLst/>
@@ -3247,7 +3247,7 @@
         </p:nvSpPr>
         <p:spPr>
           <a:xfrm>
-            <a:off x="128277" y="2132161"/>
+            <a:off x="128277" y="2209585"/>
             <a:ext cx="1594404" cy="646331"/>
           </a:xfrm>
           <a:prstGeom prst="rect">
@@ -3407,7 +3407,7 @@
         </p:nvSpPr>
         <p:spPr>
           <a:xfrm>
-            <a:off x="135413" y="3165282"/>
+            <a:off x="135413" y="3181511"/>
             <a:ext cx="1587268" cy="646331"/>
           </a:xfrm>
           <a:prstGeom prst="rect">
@@ -3627,7 +3627,7 @@
         <p:spPr>
           <a:xfrm>
             <a:off x="3489541" y="3427876"/>
-            <a:ext cx="1640593" cy="784830"/>
+            <a:ext cx="1640593" cy="923330"/>
           </a:xfrm>
           <a:prstGeom prst="rect">
             <a:avLst/>
@@ -3674,6 +3674,16 @@
             </a:pPr>
             <a:r>
               <a:rPr lang="en-US" sz="900" u="sng" noProof="1"/>
+              <a:t>analysis_id</a:t>
+            </a:r>
+          </a:p>
+          <a:p>
+            <a:pPr marL="171450" indent="-171450">
+              <a:buFontTx/>
+              <a:buChar char="-"/>
+            </a:pPr>
+            <a:r>
+              <a:rPr lang="en-US" sz="900" u="sng" noProof="1"/>
               <a:t>covariate_id</a:t>
             </a:r>
           </a:p>
@@ -3708,7 +3718,7 @@
         <p:spPr>
           <a:xfrm>
             <a:off x="135412" y="1238309"/>
-            <a:ext cx="1587269" cy="507831"/>
+            <a:ext cx="1587269" cy="646331"/>
           </a:xfrm>
           <a:prstGeom prst="rect">
             <a:avLst/>
@@ -3740,6 +3750,16 @@
             <a:r>
               <a:rPr lang="en-US" noProof="1"/>
               <a:t>covariate_analysis</a:t>
+            </a:r>
+          </a:p>
+          <a:p>
+            <a:pPr marL="171450" indent="-171450">
+              <a:buFontTx/>
+              <a:buChar char="-"/>
+            </a:pPr>
+            <a:r>
+              <a:rPr lang="en-US" b="0" u="sng" noProof="1"/>
+              <a:t>analysis_id</a:t>
             </a:r>
           </a:p>
           <a:p>
@@ -4053,7 +4073,7 @@
         </p:nvSpPr>
         <p:spPr>
           <a:xfrm>
-            <a:off x="135411" y="3887516"/>
+            <a:off x="135411" y="3903745"/>
             <a:ext cx="1587269" cy="507831"/>
           </a:xfrm>
           <a:prstGeom prst="rect">
@@ -4112,7 +4132,7 @@
         </p:nvSpPr>
         <p:spPr>
           <a:xfrm>
-            <a:off x="135411" y="4465240"/>
+            <a:off x="135411" y="4481469"/>
             <a:ext cx="1589694" cy="923330"/>
           </a:xfrm>
           <a:prstGeom prst="rect">
@@ -4279,7 +4299,7 @@
             </a:pPr>
             <a:r>
               <a:rPr lang="en-US" sz="900" u="sng" noProof="1"/>
-              <a:t>[analysis_id]</a:t>
+              <a:t>analysis_id</a:t>
             </a:r>
           </a:p>
           <a:p>
@@ -4373,7 +4393,7 @@
         <p:spPr>
           <a:xfrm>
             <a:off x="8784151" y="2601608"/>
-            <a:ext cx="1681859" cy="1061829"/>
+            <a:ext cx="1681859" cy="1200329"/>
           </a:xfrm>
           <a:prstGeom prst="rect">
             <a:avLst/>
@@ -4440,6 +4460,16 @@
             </a:pPr>
             <a:r>
               <a:rPr lang="en-US" sz="900" u="sng" noProof="1"/>
+              <a:t>analysis_id</a:t>
+            </a:r>
+          </a:p>
+          <a:p>
+            <a:pPr marL="171450" indent="-171450">
+              <a:buFontTx/>
+              <a:buChar char="-"/>
+            </a:pPr>
+            <a:r>
+              <a:rPr lang="en-US" sz="900" u="sng" noProof="1"/>
               <a:t>preference_score</a:t>
             </a:r>
           </a:p>
@@ -4473,7 +4503,7 @@
         </p:nvSpPr>
         <p:spPr>
           <a:xfrm>
-            <a:off x="57505" y="1940071"/>
+            <a:off x="56625" y="1987176"/>
             <a:ext cx="675185" cy="230832"/>
           </a:xfrm>
           <a:prstGeom prst="rect">
@@ -4506,7 +4536,7 @@
         </p:nvSpPr>
         <p:spPr>
           <a:xfrm>
-            <a:off x="72655" y="2980092"/>
+            <a:off x="72655" y="2970940"/>
             <a:ext cx="659155" cy="230832"/>
           </a:xfrm>
           <a:prstGeom prst="rect">
@@ -4721,7 +4751,7 @@
         <p:spPr>
           <a:xfrm>
             <a:off x="10521005" y="2781297"/>
-            <a:ext cx="1524645" cy="923330"/>
+            <a:ext cx="1524645" cy="1061829"/>
           </a:xfrm>
           <a:prstGeom prst="rect">
             <a:avLst/>
@@ -4779,6 +4809,16 @@
             <a:r>
               <a:rPr lang="en-US" sz="900" u="sng" noProof="1"/>
               <a:t>comparator_id</a:t>
+            </a:r>
+          </a:p>
+          <a:p>
+            <a:pPr marL="171450" indent="-171450">
+              <a:buFontTx/>
+              <a:buChar char="-"/>
+            </a:pPr>
+            <a:r>
+              <a:rPr lang="en-US" sz="900" u="sng" noProof="1"/>
+              <a:t>analysis_id</a:t>
             </a:r>
           </a:p>
           <a:p>
@@ -5085,7 +5125,7 @@
         </p:nvSpPr>
         <p:spPr>
           <a:xfrm>
-            <a:off x="1906713" y="4768270"/>
+            <a:off x="1913390" y="4692650"/>
             <a:ext cx="3067453" cy="784830"/>
           </a:xfrm>
           <a:prstGeom prst="rect">

</xml_diff>